<commit_message>
Time measurement file upload
</commit_message>
<xml_diff>
--- a/001. 세미나 자료/02.2015/02. 2차시/00. Matrix Vector Multiplyer.pptx
+++ b/001. 세미나 자료/02.2015/02. 2차시/00. Matrix Vector Multiplyer.pptx
@@ -243,7 +243,7 @@
           <a:p>
             <a:fld id="{FF628BDA-676F-468F-A4D0-5D4E4D5A3518}" type="datetimeFigureOut">
               <a:rPr lang="ko-KR" altLang="en-US" smtClean="0"/>
-              <a:t>2015-02-17</a:t>
+              <a:t>2015-02-18</a:t>
             </a:fld>
             <a:endParaRPr lang="ko-KR" altLang="en-US"/>
           </a:p>
@@ -413,7 +413,7 @@
           <a:p>
             <a:fld id="{FF628BDA-676F-468F-A4D0-5D4E4D5A3518}" type="datetimeFigureOut">
               <a:rPr lang="ko-KR" altLang="en-US" smtClean="0"/>
-              <a:t>2015-02-17</a:t>
+              <a:t>2015-02-18</a:t>
             </a:fld>
             <a:endParaRPr lang="ko-KR" altLang="en-US"/>
           </a:p>
@@ -593,7 +593,7 @@
           <a:p>
             <a:fld id="{FF628BDA-676F-468F-A4D0-5D4E4D5A3518}" type="datetimeFigureOut">
               <a:rPr lang="ko-KR" altLang="en-US" smtClean="0"/>
-              <a:t>2015-02-17</a:t>
+              <a:t>2015-02-18</a:t>
             </a:fld>
             <a:endParaRPr lang="ko-KR" altLang="en-US"/>
           </a:p>
@@ -763,7 +763,7 @@
           <a:p>
             <a:fld id="{FF628BDA-676F-468F-A4D0-5D4E4D5A3518}" type="datetimeFigureOut">
               <a:rPr lang="ko-KR" altLang="en-US" smtClean="0"/>
-              <a:t>2015-02-17</a:t>
+              <a:t>2015-02-18</a:t>
             </a:fld>
             <a:endParaRPr lang="ko-KR" altLang="en-US"/>
           </a:p>
@@ -1009,7 +1009,7 @@
           <a:p>
             <a:fld id="{FF628BDA-676F-468F-A4D0-5D4E4D5A3518}" type="datetimeFigureOut">
               <a:rPr lang="ko-KR" altLang="en-US" smtClean="0"/>
-              <a:t>2015-02-17</a:t>
+              <a:t>2015-02-18</a:t>
             </a:fld>
             <a:endParaRPr lang="ko-KR" altLang="en-US"/>
           </a:p>
@@ -1241,7 +1241,7 @@
           <a:p>
             <a:fld id="{FF628BDA-676F-468F-A4D0-5D4E4D5A3518}" type="datetimeFigureOut">
               <a:rPr lang="ko-KR" altLang="en-US" smtClean="0"/>
-              <a:t>2015-02-17</a:t>
+              <a:t>2015-02-18</a:t>
             </a:fld>
             <a:endParaRPr lang="ko-KR" altLang="en-US"/>
           </a:p>
@@ -1608,7 +1608,7 @@
           <a:p>
             <a:fld id="{FF628BDA-676F-468F-A4D0-5D4E4D5A3518}" type="datetimeFigureOut">
               <a:rPr lang="ko-KR" altLang="en-US" smtClean="0"/>
-              <a:t>2015-02-17</a:t>
+              <a:t>2015-02-18</a:t>
             </a:fld>
             <a:endParaRPr lang="ko-KR" altLang="en-US"/>
           </a:p>
@@ -1726,7 +1726,7 @@
           <a:p>
             <a:fld id="{FF628BDA-676F-468F-A4D0-5D4E4D5A3518}" type="datetimeFigureOut">
               <a:rPr lang="ko-KR" altLang="en-US" smtClean="0"/>
-              <a:t>2015-02-17</a:t>
+              <a:t>2015-02-18</a:t>
             </a:fld>
             <a:endParaRPr lang="ko-KR" altLang="en-US"/>
           </a:p>
@@ -1821,7 +1821,7 @@
           <a:p>
             <a:fld id="{FF628BDA-676F-468F-A4D0-5D4E4D5A3518}" type="datetimeFigureOut">
               <a:rPr lang="ko-KR" altLang="en-US" smtClean="0"/>
-              <a:t>2015-02-17</a:t>
+              <a:t>2015-02-18</a:t>
             </a:fld>
             <a:endParaRPr lang="ko-KR" altLang="en-US"/>
           </a:p>
@@ -2098,7 +2098,7 @@
           <a:p>
             <a:fld id="{FF628BDA-676F-468F-A4D0-5D4E4D5A3518}" type="datetimeFigureOut">
               <a:rPr lang="ko-KR" altLang="en-US" smtClean="0"/>
-              <a:t>2015-02-17</a:t>
+              <a:t>2015-02-18</a:t>
             </a:fld>
             <a:endParaRPr lang="ko-KR" altLang="en-US"/>
           </a:p>
@@ -2351,7 +2351,7 @@
           <a:p>
             <a:fld id="{FF628BDA-676F-468F-A4D0-5D4E4D5A3518}" type="datetimeFigureOut">
               <a:rPr lang="ko-KR" altLang="en-US" smtClean="0"/>
-              <a:t>2015-02-17</a:t>
+              <a:t>2015-02-18</a:t>
             </a:fld>
             <a:endParaRPr lang="ko-KR" altLang="en-US"/>
           </a:p>
@@ -2564,7 +2564,7 @@
           <a:p>
             <a:fld id="{FF628BDA-676F-468F-A4D0-5D4E4D5A3518}" type="datetimeFigureOut">
               <a:rPr lang="ko-KR" altLang="en-US" smtClean="0"/>
-              <a:t>2015-02-17</a:t>
+              <a:t>2015-02-18</a:t>
             </a:fld>
             <a:endParaRPr lang="ko-KR" altLang="en-US"/>
           </a:p>
@@ -2977,10 +2977,10 @@
         </p:nvGrpSpPr>
         <p:grpSpPr>
           <a:xfrm>
-            <a:off x="1155468" y="889703"/>
-            <a:ext cx="3963910" cy="1936625"/>
-            <a:chOff x="1305097" y="232997"/>
-            <a:chExt cx="3963910" cy="1936625"/>
+            <a:off x="1259741" y="889703"/>
+            <a:ext cx="3859637" cy="1936625"/>
+            <a:chOff x="1409370" y="232997"/>
+            <a:chExt cx="3859637" cy="1936625"/>
           </a:xfrm>
         </p:grpSpPr>
         <p:grpSp>
@@ -2991,10 +2991,10 @@
           </p:nvGrpSpPr>
           <p:grpSpPr>
             <a:xfrm>
-              <a:off x="1305097" y="831272"/>
-              <a:ext cx="1515189" cy="1338350"/>
-              <a:chOff x="906087" y="473825"/>
-              <a:chExt cx="2089266" cy="1845426"/>
+              <a:off x="1409370" y="824225"/>
+              <a:ext cx="1270212" cy="1345397"/>
+              <a:chOff x="1049867" y="464108"/>
+              <a:chExt cx="1751472" cy="1855143"/>
             </a:xfrm>
           </p:grpSpPr>
           <p:sp>
@@ -3005,7 +3005,7 @@
             </p:nvSpPr>
             <p:spPr>
               <a:xfrm>
-                <a:off x="906087" y="473825"/>
+                <a:off x="1049867" y="473825"/>
                 <a:ext cx="232757" cy="1845426"/>
               </a:xfrm>
               <a:prstGeom prst="leftBrace">
@@ -3048,7 +3048,7 @@
             </p:nvSpPr>
             <p:spPr>
               <a:xfrm flipH="1">
-                <a:off x="2762596" y="473825"/>
+                <a:off x="2568582" y="464108"/>
                 <a:ext cx="232757" cy="1845426"/>
               </a:xfrm>
               <a:prstGeom prst="leftBrace">
@@ -3131,9 +3131,9 @@
           <p:grpSpPr>
             <a:xfrm>
               <a:off x="3149138" y="247091"/>
-              <a:ext cx="989215" cy="1922531"/>
+              <a:ext cx="989215" cy="1454392"/>
               <a:chOff x="3149138" y="247091"/>
-              <a:chExt cx="989215" cy="1922531"/>
+              <a:chExt cx="989215" cy="1454392"/>
             </a:xfrm>
           </p:grpSpPr>
           <p:grpSp>
@@ -3144,10 +3144,10 @@
             </p:nvGrpSpPr>
             <p:grpSpPr>
               <a:xfrm>
-                <a:off x="3414008" y="831272"/>
-                <a:ext cx="459474" cy="1338350"/>
-                <a:chOff x="906087" y="473825"/>
-                <a:chExt cx="633562" cy="1845426"/>
+                <a:off x="3378311" y="831272"/>
+                <a:ext cx="495170" cy="870211"/>
+                <a:chOff x="856866" y="473825"/>
+                <a:chExt cx="682783" cy="1199918"/>
               </a:xfrm>
             </p:grpSpPr>
             <p:sp>
@@ -3158,8 +3158,8 @@
               </p:nvSpPr>
               <p:spPr>
                 <a:xfrm>
-                  <a:off x="906087" y="473825"/>
-                  <a:ext cx="232757" cy="1845426"/>
+                  <a:off x="856866" y="473825"/>
+                  <a:ext cx="281978" cy="1199918"/>
                 </a:xfrm>
                 <a:prstGeom prst="leftBrace">
                   <a:avLst/>
@@ -3201,8 +3201,8 @@
               </p:nvSpPr>
               <p:spPr>
                 <a:xfrm flipH="1">
-                  <a:off x="1306892" y="473825"/>
-                  <a:ext cx="232757" cy="1845426"/>
+                  <a:off x="1257671" y="473825"/>
+                  <a:ext cx="281978" cy="1199918"/>
                 </a:xfrm>
                 <a:prstGeom prst="leftBrace">
                   <a:avLst/>
@@ -3501,7 +3501,11 @@
                 <a:pPr algn="ctr"/>
                 <a:r>
                   <a:rPr lang="en-US" altLang="ko-KR" sz="1400" dirty="0" smtClean="0"/>
-                  <a:t>n by 1</a:t>
+                  <a:t>m </a:t>
+                </a:r>
+                <a:r>
+                  <a:rPr lang="en-US" altLang="ko-KR" sz="1400" dirty="0" smtClean="0"/>
+                  <a:t>by 1</a:t>
                 </a:r>
               </a:p>
               <a:p>
@@ -4837,7 +4841,6 @@
               <a:rPr lang="en-US" altLang="ko-KR" sz="1100" dirty="0" smtClean="0"/>
               <a:t>)</a:t>
             </a:r>
-            <a:endParaRPr lang="en-US" altLang="ko-KR" sz="1100" dirty="0" smtClean="0"/>
           </a:p>
           <a:p>
             <a:pPr marL="171450" indent="-171450">

</xml_diff>